<commit_message>
Fix Unary ++ and -- (pre)
</commit_message>
<xml_diff>
--- a/curriculum/Unit3/Operator Precedence.pptx
+++ b/curriculum/Unit3/Operator Precedence.pptx
@@ -2,10 +2,10 @@
 <file path=ppt/presentation.xml><?xml version="1.0" encoding="utf-8"?>
 <p:presentation xmlns:a="http://schemas.openxmlformats.org/drawingml/2006/main" xmlns:r="http://schemas.openxmlformats.org/officeDocument/2006/relationships" xmlns:p="http://schemas.openxmlformats.org/presentationml/2006/main" saveSubsetFonts="1" autoCompressPictures="0">
   <p:sldMasterIdLst>
-    <p:sldMasterId id="2147483648" r:id="rId1"/>
+    <p:sldMasterId id="2147483648" r:id="rId4"/>
   </p:sldMasterIdLst>
   <p:sldIdLst>
-    <p:sldId id="256" r:id="rId2"/>
+    <p:sldId id="256" r:id="rId5"/>
   </p:sldIdLst>
   <p:sldSz cx="9144000" cy="6858000" type="screen4x3"/>
   <p:notesSz cx="6858000" cy="9144000"/>
@@ -104,6 +104,22 @@
       </a:defRPr>
     </a:lvl9pPr>
   </p:defaultTextStyle>
+  <p:extLst>
+    <p:ext uri="{EFAFB233-063F-42B5-8137-9DF3F51BA10A}">
+      <p15:sldGuideLst xmlns:p15="http://schemas.microsoft.com/office/powerpoint/2012/main">
+        <p15:guide id="1" orient="horz" pos="2160">
+          <p15:clr>
+            <a:srgbClr val="A4A3A4"/>
+          </p15:clr>
+        </p15:guide>
+        <p15:guide id="2" pos="2880">
+          <p15:clr>
+            <a:srgbClr val="A4A3A4"/>
+          </p15:clr>
+        </p15:guide>
+      </p15:sldGuideLst>
+    </p:ext>
+  </p:extLst>
 </p:presentation>
 </file>
 
@@ -145,10 +161,9 @@
           <a:lstStyle/>
           <a:p>
             <a:r>
-              <a:rPr lang="en-US" smtClean="0"/>
+              <a:rPr lang="en-US"/>
               <a:t>Click to edit Master title style</a:t>
             </a:r>
-            <a:endParaRPr lang="en-US"/>
           </a:p>
         </p:txBody>
       </p:sp>
@@ -264,10 +279,9 @@
           </a:lstStyle>
           <a:p>
             <a:r>
-              <a:rPr lang="en-US" smtClean="0"/>
+              <a:rPr lang="en-US"/>
               <a:t>Click to edit Master subtitle style</a:t>
             </a:r>
-            <a:endParaRPr lang="en-US"/>
           </a:p>
         </p:txBody>
       </p:sp>
@@ -288,7 +302,7 @@
           <a:p>
             <a:fld id="{025E728D-EBC6-FE41-898D-191B89566DE4}" type="datetimeFigureOut">
               <a:rPr lang="en-US" smtClean="0"/>
-              <a:t>3/16/15</a:t>
+              <a:t>10/23/2018</a:t>
             </a:fld>
             <a:endParaRPr lang="en-US"/>
           </a:p>
@@ -382,10 +396,9 @@
           <a:lstStyle/>
           <a:p>
             <a:r>
-              <a:rPr lang="en-US" smtClean="0"/>
+              <a:rPr lang="en-US"/>
               <a:t>Click to edit Master title style</a:t>
             </a:r>
-            <a:endParaRPr lang="en-US"/>
           </a:p>
         </p:txBody>
       </p:sp>
@@ -406,38 +419,37 @@
           <a:p>
             <a:pPr lvl="0"/>
             <a:r>
-              <a:rPr lang="en-US" smtClean="0"/>
+              <a:rPr lang="en-US"/>
               <a:t>Click to edit Master text styles</a:t>
             </a:r>
           </a:p>
           <a:p>
             <a:pPr lvl="1"/>
             <a:r>
-              <a:rPr lang="en-US" smtClean="0"/>
+              <a:rPr lang="en-US"/>
               <a:t>Second level</a:t>
             </a:r>
           </a:p>
           <a:p>
             <a:pPr lvl="2"/>
             <a:r>
-              <a:rPr lang="en-US" smtClean="0"/>
+              <a:rPr lang="en-US"/>
               <a:t>Third level</a:t>
             </a:r>
           </a:p>
           <a:p>
             <a:pPr lvl="3"/>
             <a:r>
-              <a:rPr lang="en-US" smtClean="0"/>
+              <a:rPr lang="en-US"/>
               <a:t>Fourth level</a:t>
             </a:r>
           </a:p>
           <a:p>
             <a:pPr lvl="4"/>
             <a:r>
-              <a:rPr lang="en-US" smtClean="0"/>
+              <a:rPr lang="en-US"/>
               <a:t>Fifth level</a:t>
             </a:r>
-            <a:endParaRPr lang="en-US"/>
           </a:p>
         </p:txBody>
       </p:sp>
@@ -458,7 +470,7 @@
           <a:p>
             <a:fld id="{025E728D-EBC6-FE41-898D-191B89566DE4}" type="datetimeFigureOut">
               <a:rPr lang="en-US" smtClean="0"/>
-              <a:t>3/16/15</a:t>
+              <a:t>10/23/2018</a:t>
             </a:fld>
             <a:endParaRPr lang="en-US"/>
           </a:p>
@@ -557,10 +569,9 @@
           <a:lstStyle/>
           <a:p>
             <a:r>
-              <a:rPr lang="en-US" smtClean="0"/>
+              <a:rPr lang="en-US"/>
               <a:t>Click to edit Master title style</a:t>
             </a:r>
-            <a:endParaRPr lang="en-US"/>
           </a:p>
         </p:txBody>
       </p:sp>
@@ -586,38 +597,37 @@
           <a:p>
             <a:pPr lvl="0"/>
             <a:r>
-              <a:rPr lang="en-US" smtClean="0"/>
+              <a:rPr lang="en-US"/>
               <a:t>Click to edit Master text styles</a:t>
             </a:r>
           </a:p>
           <a:p>
             <a:pPr lvl="1"/>
             <a:r>
-              <a:rPr lang="en-US" smtClean="0"/>
+              <a:rPr lang="en-US"/>
               <a:t>Second level</a:t>
             </a:r>
           </a:p>
           <a:p>
             <a:pPr lvl="2"/>
             <a:r>
-              <a:rPr lang="en-US" smtClean="0"/>
+              <a:rPr lang="en-US"/>
               <a:t>Third level</a:t>
             </a:r>
           </a:p>
           <a:p>
             <a:pPr lvl="3"/>
             <a:r>
-              <a:rPr lang="en-US" smtClean="0"/>
+              <a:rPr lang="en-US"/>
               <a:t>Fourth level</a:t>
             </a:r>
           </a:p>
           <a:p>
             <a:pPr lvl="4"/>
             <a:r>
-              <a:rPr lang="en-US" smtClean="0"/>
+              <a:rPr lang="en-US"/>
               <a:t>Fifth level</a:t>
             </a:r>
-            <a:endParaRPr lang="en-US"/>
           </a:p>
         </p:txBody>
       </p:sp>
@@ -638,7 +648,7 @@
           <a:p>
             <a:fld id="{025E728D-EBC6-FE41-898D-191B89566DE4}" type="datetimeFigureOut">
               <a:rPr lang="en-US" smtClean="0"/>
-              <a:t>3/16/15</a:t>
+              <a:t>10/23/2018</a:t>
             </a:fld>
             <a:endParaRPr lang="en-US"/>
           </a:p>
@@ -732,10 +742,9 @@
           <a:lstStyle/>
           <a:p>
             <a:r>
-              <a:rPr lang="en-US" smtClean="0"/>
+              <a:rPr lang="en-US"/>
               <a:t>Click to edit Master title style</a:t>
             </a:r>
-            <a:endParaRPr lang="en-US"/>
           </a:p>
         </p:txBody>
       </p:sp>
@@ -756,38 +765,37 @@
           <a:p>
             <a:pPr lvl="0"/>
             <a:r>
-              <a:rPr lang="en-US" smtClean="0"/>
+              <a:rPr lang="en-US"/>
               <a:t>Click to edit Master text styles</a:t>
             </a:r>
           </a:p>
           <a:p>
             <a:pPr lvl="1"/>
             <a:r>
-              <a:rPr lang="en-US" smtClean="0"/>
+              <a:rPr lang="en-US"/>
               <a:t>Second level</a:t>
             </a:r>
           </a:p>
           <a:p>
             <a:pPr lvl="2"/>
             <a:r>
-              <a:rPr lang="en-US" smtClean="0"/>
+              <a:rPr lang="en-US"/>
               <a:t>Third level</a:t>
             </a:r>
           </a:p>
           <a:p>
             <a:pPr lvl="3"/>
             <a:r>
-              <a:rPr lang="en-US" smtClean="0"/>
+              <a:rPr lang="en-US"/>
               <a:t>Fourth level</a:t>
             </a:r>
           </a:p>
           <a:p>
             <a:pPr lvl="4"/>
             <a:r>
-              <a:rPr lang="en-US" smtClean="0"/>
+              <a:rPr lang="en-US"/>
               <a:t>Fifth level</a:t>
             </a:r>
-            <a:endParaRPr lang="en-US"/>
           </a:p>
         </p:txBody>
       </p:sp>
@@ -808,7 +816,7 @@
           <a:p>
             <a:fld id="{025E728D-EBC6-FE41-898D-191B89566DE4}" type="datetimeFigureOut">
               <a:rPr lang="en-US" smtClean="0"/>
-              <a:t>3/16/15</a:t>
+              <a:t>10/23/2018</a:t>
             </a:fld>
             <a:endParaRPr lang="en-US"/>
           </a:p>
@@ -911,10 +919,9 @@
           </a:lstStyle>
           <a:p>
             <a:r>
-              <a:rPr lang="en-US" smtClean="0"/>
+              <a:rPr lang="en-US"/>
               <a:t>Click to edit Master title style</a:t>
             </a:r>
-            <a:endParaRPr lang="en-US"/>
           </a:p>
         </p:txBody>
       </p:sp>
@@ -1031,7 +1038,7 @@
           <a:p>
             <a:pPr lvl="0"/>
             <a:r>
-              <a:rPr lang="en-US" smtClean="0"/>
+              <a:rPr lang="en-US"/>
               <a:t>Click to edit Master text styles</a:t>
             </a:r>
           </a:p>
@@ -1054,7 +1061,7 @@
           <a:p>
             <a:fld id="{025E728D-EBC6-FE41-898D-191B89566DE4}" type="datetimeFigureOut">
               <a:rPr lang="en-US" smtClean="0"/>
-              <a:t>3/16/15</a:t>
+              <a:t>10/23/2018</a:t>
             </a:fld>
             <a:endParaRPr lang="en-US"/>
           </a:p>
@@ -1148,10 +1155,9 @@
           <a:lstStyle/>
           <a:p>
             <a:r>
-              <a:rPr lang="en-US" smtClean="0"/>
+              <a:rPr lang="en-US"/>
               <a:t>Click to edit Master title style</a:t>
             </a:r>
-            <a:endParaRPr lang="en-US"/>
           </a:p>
         </p:txBody>
       </p:sp>
@@ -1205,38 +1211,37 @@
           <a:p>
             <a:pPr lvl="0"/>
             <a:r>
-              <a:rPr lang="en-US" smtClean="0"/>
+              <a:rPr lang="en-US"/>
               <a:t>Click to edit Master text styles</a:t>
             </a:r>
           </a:p>
           <a:p>
             <a:pPr lvl="1"/>
             <a:r>
-              <a:rPr lang="en-US" smtClean="0"/>
+              <a:rPr lang="en-US"/>
               <a:t>Second level</a:t>
             </a:r>
           </a:p>
           <a:p>
             <a:pPr lvl="2"/>
             <a:r>
-              <a:rPr lang="en-US" smtClean="0"/>
+              <a:rPr lang="en-US"/>
               <a:t>Third level</a:t>
             </a:r>
           </a:p>
           <a:p>
             <a:pPr lvl="3"/>
             <a:r>
-              <a:rPr lang="en-US" smtClean="0"/>
+              <a:rPr lang="en-US"/>
               <a:t>Fourth level</a:t>
             </a:r>
           </a:p>
           <a:p>
             <a:pPr lvl="4"/>
             <a:r>
-              <a:rPr lang="en-US" smtClean="0"/>
+              <a:rPr lang="en-US"/>
               <a:t>Fifth level</a:t>
             </a:r>
-            <a:endParaRPr lang="en-US"/>
           </a:p>
         </p:txBody>
       </p:sp>
@@ -1290,38 +1295,37 @@
           <a:p>
             <a:pPr lvl="0"/>
             <a:r>
-              <a:rPr lang="en-US" smtClean="0"/>
+              <a:rPr lang="en-US"/>
               <a:t>Click to edit Master text styles</a:t>
             </a:r>
           </a:p>
           <a:p>
             <a:pPr lvl="1"/>
             <a:r>
-              <a:rPr lang="en-US" smtClean="0"/>
+              <a:rPr lang="en-US"/>
               <a:t>Second level</a:t>
             </a:r>
           </a:p>
           <a:p>
             <a:pPr lvl="2"/>
             <a:r>
-              <a:rPr lang="en-US" smtClean="0"/>
+              <a:rPr lang="en-US"/>
               <a:t>Third level</a:t>
             </a:r>
           </a:p>
           <a:p>
             <a:pPr lvl="3"/>
             <a:r>
-              <a:rPr lang="en-US" smtClean="0"/>
+              <a:rPr lang="en-US"/>
               <a:t>Fourth level</a:t>
             </a:r>
           </a:p>
           <a:p>
             <a:pPr lvl="4"/>
             <a:r>
-              <a:rPr lang="en-US" smtClean="0"/>
+              <a:rPr lang="en-US"/>
               <a:t>Fifth level</a:t>
             </a:r>
-            <a:endParaRPr lang="en-US"/>
           </a:p>
         </p:txBody>
       </p:sp>
@@ -1342,7 +1346,7 @@
           <a:p>
             <a:fld id="{025E728D-EBC6-FE41-898D-191B89566DE4}" type="datetimeFigureOut">
               <a:rPr lang="en-US" smtClean="0"/>
-              <a:t>3/16/15</a:t>
+              <a:t>10/23/2018</a:t>
             </a:fld>
             <a:endParaRPr lang="en-US"/>
           </a:p>
@@ -1440,10 +1444,9 @@
           </a:lstStyle>
           <a:p>
             <a:r>
-              <a:rPr lang="en-US" smtClean="0"/>
+              <a:rPr lang="en-US"/>
               <a:t>Click to edit Master title style</a:t>
             </a:r>
-            <a:endParaRPr lang="en-US"/>
           </a:p>
         </p:txBody>
       </p:sp>
@@ -1506,7 +1509,7 @@
           <a:p>
             <a:pPr lvl="0"/>
             <a:r>
-              <a:rPr lang="en-US" smtClean="0"/>
+              <a:rPr lang="en-US"/>
               <a:t>Click to edit Master text styles</a:t>
             </a:r>
           </a:p>
@@ -1562,38 +1565,37 @@
           <a:p>
             <a:pPr lvl="0"/>
             <a:r>
-              <a:rPr lang="en-US" smtClean="0"/>
+              <a:rPr lang="en-US"/>
               <a:t>Click to edit Master text styles</a:t>
             </a:r>
           </a:p>
           <a:p>
             <a:pPr lvl="1"/>
             <a:r>
-              <a:rPr lang="en-US" smtClean="0"/>
+              <a:rPr lang="en-US"/>
               <a:t>Second level</a:t>
             </a:r>
           </a:p>
           <a:p>
             <a:pPr lvl="2"/>
             <a:r>
-              <a:rPr lang="en-US" smtClean="0"/>
+              <a:rPr lang="en-US"/>
               <a:t>Third level</a:t>
             </a:r>
           </a:p>
           <a:p>
             <a:pPr lvl="3"/>
             <a:r>
-              <a:rPr lang="en-US" smtClean="0"/>
+              <a:rPr lang="en-US"/>
               <a:t>Fourth level</a:t>
             </a:r>
           </a:p>
           <a:p>
             <a:pPr lvl="4"/>
             <a:r>
-              <a:rPr lang="en-US" smtClean="0"/>
+              <a:rPr lang="en-US"/>
               <a:t>Fifth level</a:t>
             </a:r>
-            <a:endParaRPr lang="en-US"/>
           </a:p>
         </p:txBody>
       </p:sp>
@@ -1656,7 +1658,7 @@
           <a:p>
             <a:pPr lvl="0"/>
             <a:r>
-              <a:rPr lang="en-US" smtClean="0"/>
+              <a:rPr lang="en-US"/>
               <a:t>Click to edit Master text styles</a:t>
             </a:r>
           </a:p>
@@ -1712,38 +1714,37 @@
           <a:p>
             <a:pPr lvl="0"/>
             <a:r>
-              <a:rPr lang="en-US" smtClean="0"/>
+              <a:rPr lang="en-US"/>
               <a:t>Click to edit Master text styles</a:t>
             </a:r>
           </a:p>
           <a:p>
             <a:pPr lvl="1"/>
             <a:r>
-              <a:rPr lang="en-US" smtClean="0"/>
+              <a:rPr lang="en-US"/>
               <a:t>Second level</a:t>
             </a:r>
           </a:p>
           <a:p>
             <a:pPr lvl="2"/>
             <a:r>
-              <a:rPr lang="en-US" smtClean="0"/>
+              <a:rPr lang="en-US"/>
               <a:t>Third level</a:t>
             </a:r>
           </a:p>
           <a:p>
             <a:pPr lvl="3"/>
             <a:r>
-              <a:rPr lang="en-US" smtClean="0"/>
+              <a:rPr lang="en-US"/>
               <a:t>Fourth level</a:t>
             </a:r>
           </a:p>
           <a:p>
             <a:pPr lvl="4"/>
             <a:r>
-              <a:rPr lang="en-US" smtClean="0"/>
+              <a:rPr lang="en-US"/>
               <a:t>Fifth level</a:t>
             </a:r>
-            <a:endParaRPr lang="en-US"/>
           </a:p>
         </p:txBody>
       </p:sp>
@@ -1764,7 +1765,7 @@
           <a:p>
             <a:fld id="{025E728D-EBC6-FE41-898D-191B89566DE4}" type="datetimeFigureOut">
               <a:rPr lang="en-US" smtClean="0"/>
-              <a:t>3/16/15</a:t>
+              <a:t>10/23/2018</a:t>
             </a:fld>
             <a:endParaRPr lang="en-US"/>
           </a:p>
@@ -1858,10 +1859,9 @@
           <a:lstStyle/>
           <a:p>
             <a:r>
-              <a:rPr lang="en-US" smtClean="0"/>
+              <a:rPr lang="en-US"/>
               <a:t>Click to edit Master title style</a:t>
             </a:r>
-            <a:endParaRPr lang="en-US"/>
           </a:p>
         </p:txBody>
       </p:sp>
@@ -1882,7 +1882,7 @@
           <a:p>
             <a:fld id="{025E728D-EBC6-FE41-898D-191B89566DE4}" type="datetimeFigureOut">
               <a:rPr lang="en-US" smtClean="0"/>
-              <a:t>3/16/15</a:t>
+              <a:t>10/23/2018</a:t>
             </a:fld>
             <a:endParaRPr lang="en-US"/>
           </a:p>
@@ -1977,7 +1977,7 @@
           <a:p>
             <a:fld id="{025E728D-EBC6-FE41-898D-191B89566DE4}" type="datetimeFigureOut">
               <a:rPr lang="en-US" smtClean="0"/>
-              <a:t>3/16/15</a:t>
+              <a:t>10/23/2018</a:t>
             </a:fld>
             <a:endParaRPr lang="en-US"/>
           </a:p>
@@ -2080,10 +2080,9 @@
           </a:lstStyle>
           <a:p>
             <a:r>
-              <a:rPr lang="en-US" smtClean="0"/>
+              <a:rPr lang="en-US"/>
               <a:t>Click to edit Master title style</a:t>
             </a:r>
-            <a:endParaRPr lang="en-US"/>
           </a:p>
         </p:txBody>
       </p:sp>
@@ -2137,38 +2136,37 @@
           <a:p>
             <a:pPr lvl="0"/>
             <a:r>
-              <a:rPr lang="en-US" smtClean="0"/>
+              <a:rPr lang="en-US"/>
               <a:t>Click to edit Master text styles</a:t>
             </a:r>
           </a:p>
           <a:p>
             <a:pPr lvl="1"/>
             <a:r>
-              <a:rPr lang="en-US" smtClean="0"/>
+              <a:rPr lang="en-US"/>
               <a:t>Second level</a:t>
             </a:r>
           </a:p>
           <a:p>
             <a:pPr lvl="2"/>
             <a:r>
-              <a:rPr lang="en-US" smtClean="0"/>
+              <a:rPr lang="en-US"/>
               <a:t>Third level</a:t>
             </a:r>
           </a:p>
           <a:p>
             <a:pPr lvl="3"/>
             <a:r>
-              <a:rPr lang="en-US" smtClean="0"/>
+              <a:rPr lang="en-US"/>
               <a:t>Fourth level</a:t>
             </a:r>
           </a:p>
           <a:p>
             <a:pPr lvl="4"/>
             <a:r>
-              <a:rPr lang="en-US" smtClean="0"/>
+              <a:rPr lang="en-US"/>
               <a:t>Fifth level</a:t>
             </a:r>
-            <a:endParaRPr lang="en-US"/>
           </a:p>
         </p:txBody>
       </p:sp>
@@ -2231,7 +2229,7 @@
           <a:p>
             <a:pPr lvl="0"/>
             <a:r>
-              <a:rPr lang="en-US" smtClean="0"/>
+              <a:rPr lang="en-US"/>
               <a:t>Click to edit Master text styles</a:t>
             </a:r>
           </a:p>
@@ -2254,7 +2252,7 @@
           <a:p>
             <a:fld id="{025E728D-EBC6-FE41-898D-191B89566DE4}" type="datetimeFigureOut">
               <a:rPr lang="en-US" smtClean="0"/>
-              <a:t>3/16/15</a:t>
+              <a:t>10/23/2018</a:t>
             </a:fld>
             <a:endParaRPr lang="en-US"/>
           </a:p>
@@ -2357,10 +2355,9 @@
           </a:lstStyle>
           <a:p>
             <a:r>
-              <a:rPr lang="en-US" smtClean="0"/>
+              <a:rPr lang="en-US"/>
               <a:t>Click to edit Master title style</a:t>
             </a:r>
-            <a:endParaRPr lang="en-US"/>
           </a:p>
         </p:txBody>
       </p:sp>
@@ -2484,7 +2481,7 @@
           <a:p>
             <a:pPr lvl="0"/>
             <a:r>
-              <a:rPr lang="en-US" smtClean="0"/>
+              <a:rPr lang="en-US"/>
               <a:t>Click to edit Master text styles</a:t>
             </a:r>
           </a:p>
@@ -2507,7 +2504,7 @@
           <a:p>
             <a:fld id="{025E728D-EBC6-FE41-898D-191B89566DE4}" type="datetimeFigureOut">
               <a:rPr lang="en-US" smtClean="0"/>
-              <a:t>3/16/15</a:t>
+              <a:t>10/23/2018</a:t>
             </a:fld>
             <a:endParaRPr lang="en-US"/>
           </a:p>
@@ -2616,10 +2613,9 @@
           <a:lstStyle/>
           <a:p>
             <a:r>
-              <a:rPr lang="en-US" smtClean="0"/>
+              <a:rPr lang="en-US"/>
               <a:t>Click to edit Master title style</a:t>
             </a:r>
-            <a:endParaRPr lang="en-US"/>
           </a:p>
         </p:txBody>
       </p:sp>
@@ -2650,38 +2646,37 @@
           <a:p>
             <a:pPr lvl="0"/>
             <a:r>
-              <a:rPr lang="en-US" smtClean="0"/>
+              <a:rPr lang="en-US"/>
               <a:t>Click to edit Master text styles</a:t>
             </a:r>
           </a:p>
           <a:p>
             <a:pPr lvl="1"/>
             <a:r>
-              <a:rPr lang="en-US" smtClean="0"/>
+              <a:rPr lang="en-US"/>
               <a:t>Second level</a:t>
             </a:r>
           </a:p>
           <a:p>
             <a:pPr lvl="2"/>
             <a:r>
-              <a:rPr lang="en-US" smtClean="0"/>
+              <a:rPr lang="en-US"/>
               <a:t>Third level</a:t>
             </a:r>
           </a:p>
           <a:p>
             <a:pPr lvl="3"/>
             <a:r>
-              <a:rPr lang="en-US" smtClean="0"/>
+              <a:rPr lang="en-US"/>
               <a:t>Fourth level</a:t>
             </a:r>
           </a:p>
           <a:p>
             <a:pPr lvl="4"/>
             <a:r>
-              <a:rPr lang="en-US" smtClean="0"/>
+              <a:rPr lang="en-US"/>
               <a:t>Fifth level</a:t>
             </a:r>
-            <a:endParaRPr lang="en-US"/>
           </a:p>
         </p:txBody>
       </p:sp>
@@ -2720,7 +2715,7 @@
           <a:p>
             <a:fld id="{025E728D-EBC6-FE41-898D-191B89566DE4}" type="datetimeFigureOut">
               <a:rPr lang="en-US" smtClean="0"/>
-              <a:t>3/16/15</a:t>
+              <a:t>10/23/2018</a:t>
             </a:fld>
             <a:endParaRPr lang="en-US"/>
           </a:p>
@@ -3104,7 +3099,7 @@
           <p:nvPr>
             <p:extLst>
               <p:ext uri="{D42A27DB-BD31-4B8C-83A1-F6EECF244321}">
-                <p14:modId xmlns:p14="http://schemas.microsoft.com/office/powerpoint/2010/main" val="396673888"/>
+                <p14:modId xmlns:p14="http://schemas.microsoft.com/office/powerpoint/2010/main" val="376984280"/>
               </p:ext>
             </p:extLst>
           </p:nvPr>
@@ -3127,9 +3122,27 @@
                 <a:tableStyleId>{638B1855-1B75-4FBE-930C-398BA8C253C6}</a:tableStyleId>
               </a:tblPr>
               <a:tblGrid>
-                <a:gridCol w="2896491"/>
-                <a:gridCol w="2896491"/>
-                <a:gridCol w="2896491"/>
+                <a:gridCol w="2896491">
+                  <a:extLst>
+                    <a:ext uri="{9D8B030D-6E8A-4147-A177-3AD203B41FA5}">
+                      <a16:colId xmlns:a16="http://schemas.microsoft.com/office/drawing/2014/main" val="20000"/>
+                    </a:ext>
+                  </a:extLst>
+                </a:gridCol>
+                <a:gridCol w="2896491">
+                  <a:extLst>
+                    <a:ext uri="{9D8B030D-6E8A-4147-A177-3AD203B41FA5}">
+                      <a16:colId xmlns:a16="http://schemas.microsoft.com/office/drawing/2014/main" val="20001"/>
+                    </a:ext>
+                  </a:extLst>
+                </a:gridCol>
+                <a:gridCol w="2896491">
+                  <a:extLst>
+                    <a:ext uri="{9D8B030D-6E8A-4147-A177-3AD203B41FA5}">
+                      <a16:colId xmlns:a16="http://schemas.microsoft.com/office/drawing/2014/main" val="20002"/>
+                    </a:ext>
+                  </a:extLst>
+                </a:gridCol>
               </a:tblGrid>
               <a:tr h="370840">
                 <a:tc>
@@ -3139,10 +3152,9 @@
                     <a:p>
                       <a:pPr algn="ctr"/>
                       <a:r>
-                        <a:rPr lang="en-US" sz="2400" dirty="0" smtClean="0"/>
+                        <a:rPr lang="en-US" sz="2400" dirty="0"/>
                         <a:t>Operator Type</a:t>
                       </a:r>
-                      <a:endParaRPr lang="en-US" sz="2400" dirty="0"/>
                     </a:p>
                   </a:txBody>
                   <a:tcPr>
@@ -3159,10 +3171,9 @@
                     <a:p>
                       <a:pPr algn="ctr"/>
                       <a:r>
-                        <a:rPr lang="en-US" sz="2400" dirty="0" smtClean="0"/>
+                        <a:rPr lang="en-US" sz="2400" dirty="0"/>
                         <a:t>Operator</a:t>
                       </a:r>
-                      <a:endParaRPr lang="en-US" sz="2400" dirty="0"/>
                     </a:p>
                   </a:txBody>
                   <a:tcPr>
@@ -3179,11 +3190,11 @@
                     <a:p>
                       <a:pPr algn="ctr"/>
                       <a:r>
-                        <a:rPr lang="en-US" sz="2400" dirty="0" smtClean="0"/>
+                        <a:rPr lang="en-US" sz="2400" dirty="0"/>
                         <a:t>Java Flow</a:t>
                       </a:r>
                       <a:r>
-                        <a:rPr lang="en-US" sz="2400" baseline="0" dirty="0" smtClean="0"/>
+                        <a:rPr lang="en-US" sz="2400" baseline="0" dirty="0"/>
                         <a:t> of Control</a:t>
                       </a:r>
                       <a:endParaRPr lang="en-US" sz="2400" dirty="0"/>
@@ -3196,6 +3207,11 @@
                     </a:cell3D>
                   </a:tcPr>
                 </a:tc>
+                <a:extLst>
+                  <a:ext uri="{0D108BD9-81ED-4DB2-BD59-A6C34878D82A}">
+                    <a16:rowId xmlns:a16="http://schemas.microsoft.com/office/drawing/2014/main" val="10000"/>
+                  </a:ext>
+                </a:extLst>
               </a:tr>
               <a:tr h="370840">
                 <a:tc>
@@ -3204,22 +3220,22 @@
                     <a:lstStyle/>
                     <a:p>
                       <a:pPr algn="ctr"/>
-                      <a:endParaRPr lang="en-US" sz="1000" dirty="0" smtClean="0"/>
+                      <a:endParaRPr lang="en-US" sz="1000" dirty="0"/>
                     </a:p>
                     <a:p>
                       <a:pPr algn="ctr"/>
                       <a:r>
-                        <a:rPr lang="en-US" sz="2000" dirty="0" smtClean="0"/>
+                        <a:rPr lang="en-US" sz="2000" dirty="0"/>
                         <a:t>Unary</a:t>
                       </a:r>
                       <a:r>
-                        <a:rPr lang="en-US" sz="2400" dirty="0" smtClean="0"/>
+                        <a:rPr lang="en-US" sz="2400" dirty="0"/>
                         <a:t> </a:t>
                       </a:r>
                     </a:p>
                     <a:p>
                       <a:pPr algn="ctr"/>
-                      <a:endParaRPr lang="en-US" sz="1100" dirty="0" smtClean="0"/>
+                      <a:endParaRPr lang="en-US" sz="1100" dirty="0"/>
                     </a:p>
                   </a:txBody>
                   <a:tcPr>
@@ -3235,15 +3251,14 @@
                     <a:lstStyle/>
                     <a:p>
                       <a:pPr algn="ctr"/>
-                      <a:endParaRPr lang="en-US" sz="1100" dirty="0" smtClean="0"/>
+                      <a:endParaRPr lang="en-US" sz="1100" dirty="0"/>
                     </a:p>
                     <a:p>
                       <a:pPr algn="ctr"/>
                       <a:r>
-                        <a:rPr lang="en-US" sz="2000" dirty="0" smtClean="0"/>
-                        <a:t>!    ++   --    +    -</a:t>
+                        <a:rPr lang="en-US" sz="2000" dirty="0"/>
+                        <a:t>!    ++(pre)   --(pre)    +    -</a:t>
                       </a:r>
-                      <a:endParaRPr lang="en-US" sz="2000" dirty="0"/>
                     </a:p>
                   </a:txBody>
                   <a:tcPr>
@@ -3260,11 +3275,11 @@
                     <a:p>
                       <a:pPr algn="ctr"/>
                       <a:r>
-                        <a:rPr lang="en-US" sz="2000" dirty="0" smtClean="0"/>
+                        <a:rPr lang="en-US" sz="2000" dirty="0"/>
                         <a:t>Java Evaluates</a:t>
                       </a:r>
                       <a:r>
-                        <a:rPr lang="en-US" sz="2000" baseline="0" dirty="0" smtClean="0"/>
+                        <a:rPr lang="en-US" sz="2000" baseline="0" dirty="0"/>
                         <a:t> First</a:t>
                       </a:r>
                       <a:endParaRPr lang="en-US" sz="2000" dirty="0"/>
@@ -3277,6 +3292,11 @@
                     </a:cell3D>
                   </a:tcPr>
                 </a:tc>
+                <a:extLst>
+                  <a:ext uri="{0D108BD9-81ED-4DB2-BD59-A6C34878D82A}">
+                    <a16:rowId xmlns:a16="http://schemas.microsoft.com/office/drawing/2014/main" val="10001"/>
+                  </a:ext>
+                </a:extLst>
               </a:tr>
               <a:tr h="370840">
                 <a:tc>
@@ -3285,12 +3305,12 @@
                     <a:lstStyle/>
                     <a:p>
                       <a:pPr algn="ctr"/>
-                      <a:endParaRPr lang="en-US" sz="1100" dirty="0" smtClean="0"/>
+                      <a:endParaRPr lang="en-US" sz="1100" dirty="0"/>
                     </a:p>
                     <a:p>
                       <a:pPr algn="ctr"/>
                       <a:r>
-                        <a:rPr lang="en-US" sz="2000" dirty="0" smtClean="0"/>
+                        <a:rPr lang="en-US" sz="2000" dirty="0"/>
                         <a:t>Multiplicative</a:t>
                       </a:r>
                     </a:p>
@@ -3312,15 +3332,14 @@
                     <a:lstStyle/>
                     <a:p>
                       <a:pPr algn="ctr"/>
-                      <a:endParaRPr lang="en-US" sz="1200" dirty="0" smtClean="0"/>
+                      <a:endParaRPr lang="en-US" sz="1200" dirty="0"/>
                     </a:p>
                     <a:p>
                       <a:pPr algn="ctr"/>
                       <a:r>
-                        <a:rPr lang="en-US" sz="2000" dirty="0" smtClean="0"/>
+                        <a:rPr lang="en-US" sz="2000" dirty="0"/>
                         <a:t>*      /      %</a:t>
                       </a:r>
-                      <a:endParaRPr lang="en-US" sz="2000" dirty="0"/>
                     </a:p>
                   </a:txBody>
                   <a:tcPr>
@@ -3346,6 +3365,11 @@
                     </a:cell3D>
                   </a:tcPr>
                 </a:tc>
+                <a:extLst>
+                  <a:ext uri="{0D108BD9-81ED-4DB2-BD59-A6C34878D82A}">
+                    <a16:rowId xmlns:a16="http://schemas.microsoft.com/office/drawing/2014/main" val="10002"/>
+                  </a:ext>
+                </a:extLst>
               </a:tr>
               <a:tr h="370840">
                 <a:tc>
@@ -3354,12 +3378,12 @@
                     <a:lstStyle/>
                     <a:p>
                       <a:pPr algn="ctr"/>
-                      <a:endParaRPr lang="en-US" sz="1100" dirty="0" smtClean="0"/>
+                      <a:endParaRPr lang="en-US" sz="1100" dirty="0"/>
                     </a:p>
                     <a:p>
                       <a:pPr algn="ctr"/>
                       <a:r>
-                        <a:rPr lang="en-US" sz="2000" dirty="0" smtClean="0"/>
+                        <a:rPr lang="en-US" sz="2000" dirty="0"/>
                         <a:t>Additive</a:t>
                       </a:r>
                     </a:p>
@@ -3381,15 +3405,14 @@
                     <a:lstStyle/>
                     <a:p>
                       <a:pPr algn="ctr"/>
-                      <a:endParaRPr lang="en-US" sz="1200" dirty="0" smtClean="0"/>
+                      <a:endParaRPr lang="en-US" sz="1200" dirty="0"/>
                     </a:p>
                     <a:p>
                       <a:pPr algn="ctr"/>
                       <a:r>
-                        <a:rPr lang="en-US" sz="2000" dirty="0" smtClean="0"/>
+                        <a:rPr lang="en-US" sz="2000" dirty="0"/>
                         <a:t>+      -</a:t>
                       </a:r>
-                      <a:endParaRPr lang="en-US" sz="2000" dirty="0"/>
                     </a:p>
                   </a:txBody>
                   <a:tcPr>
@@ -3415,6 +3438,11 @@
                     </a:cell3D>
                   </a:tcPr>
                 </a:tc>
+                <a:extLst>
+                  <a:ext uri="{0D108BD9-81ED-4DB2-BD59-A6C34878D82A}">
+                    <a16:rowId xmlns:a16="http://schemas.microsoft.com/office/drawing/2014/main" val="10003"/>
+                  </a:ext>
+                </a:extLst>
               </a:tr>
               <a:tr h="370840">
                 <a:tc>
@@ -3423,12 +3451,12 @@
                     <a:lstStyle/>
                     <a:p>
                       <a:pPr algn="ctr"/>
-                      <a:endParaRPr lang="en-US" sz="1100" dirty="0" smtClean="0"/>
+                      <a:endParaRPr lang="en-US" sz="1100" dirty="0"/>
                     </a:p>
                     <a:p>
                       <a:pPr algn="ctr"/>
                       <a:r>
-                        <a:rPr lang="en-US" sz="2000" dirty="0" smtClean="0"/>
+                        <a:rPr lang="en-US" sz="2000" dirty="0"/>
                         <a:t>Relational</a:t>
                       </a:r>
                     </a:p>
@@ -3450,15 +3478,14 @@
                     <a:lstStyle/>
                     <a:p>
                       <a:pPr algn="ctr"/>
-                      <a:endParaRPr lang="en-US" sz="1200" dirty="0" smtClean="0"/>
+                      <a:endParaRPr lang="en-US" sz="1200" dirty="0"/>
                     </a:p>
                     <a:p>
                       <a:pPr algn="ctr"/>
                       <a:r>
-                        <a:rPr lang="en-US" sz="2000" dirty="0" smtClean="0"/>
+                        <a:rPr lang="en-US" sz="2000" dirty="0"/>
                         <a:t>&lt;      &gt;     &lt;=      &gt;=</a:t>
                       </a:r>
-                      <a:endParaRPr lang="en-US" sz="2000" dirty="0"/>
                     </a:p>
                   </a:txBody>
                   <a:tcPr>
@@ -3484,6 +3511,11 @@
                     </a:cell3D>
                   </a:tcPr>
                 </a:tc>
+                <a:extLst>
+                  <a:ext uri="{0D108BD9-81ED-4DB2-BD59-A6C34878D82A}">
+                    <a16:rowId xmlns:a16="http://schemas.microsoft.com/office/drawing/2014/main" val="10004"/>
+                  </a:ext>
+                </a:extLst>
               </a:tr>
               <a:tr h="370840">
                 <a:tc>
@@ -3492,12 +3524,12 @@
                     <a:lstStyle/>
                     <a:p>
                       <a:pPr algn="ctr"/>
-                      <a:endParaRPr lang="en-US" sz="1200" dirty="0" smtClean="0"/>
+                      <a:endParaRPr lang="en-US" sz="1200" dirty="0"/>
                     </a:p>
                     <a:p>
                       <a:pPr algn="ctr"/>
                       <a:r>
-                        <a:rPr lang="en-US" sz="2000" dirty="0" smtClean="0"/>
+                        <a:rPr lang="en-US" sz="2000" dirty="0"/>
                         <a:t>Equality</a:t>
                       </a:r>
                     </a:p>
@@ -3519,15 +3551,14 @@
                     <a:lstStyle/>
                     <a:p>
                       <a:pPr algn="ctr"/>
-                      <a:endParaRPr lang="en-US" sz="1200" dirty="0" smtClean="0"/>
+                      <a:endParaRPr lang="en-US" sz="1200" dirty="0"/>
                     </a:p>
                     <a:p>
                       <a:pPr algn="ctr"/>
                       <a:r>
-                        <a:rPr lang="en-US" sz="2000" dirty="0" smtClean="0"/>
+                        <a:rPr lang="en-US" sz="2000" dirty="0"/>
                         <a:t>==      !=</a:t>
                       </a:r>
-                      <a:endParaRPr lang="en-US" sz="2000" dirty="0"/>
                     </a:p>
                   </a:txBody>
                   <a:tcPr>
@@ -3553,6 +3584,11 @@
                     </a:cell3D>
                   </a:tcPr>
                 </a:tc>
+                <a:extLst>
+                  <a:ext uri="{0D108BD9-81ED-4DB2-BD59-A6C34878D82A}">
+                    <a16:rowId xmlns:a16="http://schemas.microsoft.com/office/drawing/2014/main" val="10005"/>
+                  </a:ext>
+                </a:extLst>
               </a:tr>
               <a:tr h="370840">
                 <a:tc>
@@ -3561,12 +3597,12 @@
                     <a:lstStyle/>
                     <a:p>
                       <a:pPr algn="ctr"/>
-                      <a:endParaRPr lang="en-US" sz="1100" dirty="0" smtClean="0"/>
+                      <a:endParaRPr lang="en-US" sz="1100" dirty="0"/>
                     </a:p>
                     <a:p>
                       <a:pPr algn="ctr"/>
                       <a:r>
-                        <a:rPr lang="en-US" sz="2000" dirty="0" smtClean="0"/>
+                        <a:rPr lang="en-US" sz="2000" dirty="0"/>
                         <a:t>Logical “AND”</a:t>
                       </a:r>
                     </a:p>
@@ -3588,15 +3624,14 @@
                     <a:lstStyle/>
                     <a:p>
                       <a:pPr algn="ctr"/>
-                      <a:endParaRPr lang="en-US" sz="1200" dirty="0" smtClean="0"/>
+                      <a:endParaRPr lang="en-US" sz="1200" dirty="0"/>
                     </a:p>
                     <a:p>
                       <a:pPr algn="ctr"/>
                       <a:r>
-                        <a:rPr lang="en-US" sz="2000" dirty="0" smtClean="0"/>
+                        <a:rPr lang="en-US" sz="2000" dirty="0"/>
                         <a:t>&amp;&amp;</a:t>
                       </a:r>
-                      <a:endParaRPr lang="en-US" sz="2000" dirty="0"/>
                     </a:p>
                   </a:txBody>
                   <a:tcPr>
@@ -3622,6 +3657,11 @@
                     </a:cell3D>
                   </a:tcPr>
                 </a:tc>
+                <a:extLst>
+                  <a:ext uri="{0D108BD9-81ED-4DB2-BD59-A6C34878D82A}">
+                    <a16:rowId xmlns:a16="http://schemas.microsoft.com/office/drawing/2014/main" val="10006"/>
+                  </a:ext>
+                </a:extLst>
               </a:tr>
               <a:tr h="370840">
                 <a:tc>
@@ -3630,12 +3670,12 @@
                     <a:lstStyle/>
                     <a:p>
                       <a:pPr algn="ctr"/>
-                      <a:endParaRPr lang="en-US" sz="1100" dirty="0" smtClean="0"/>
+                      <a:endParaRPr lang="en-US" sz="1100" dirty="0"/>
                     </a:p>
                     <a:p>
                       <a:pPr algn="ctr"/>
                       <a:r>
-                        <a:rPr lang="en-US" sz="2000" dirty="0" smtClean="0"/>
+                        <a:rPr lang="en-US" sz="2000" dirty="0"/>
                         <a:t>Logical “OR”</a:t>
                       </a:r>
                     </a:p>
@@ -3657,15 +3697,14 @@
                     <a:lstStyle/>
                     <a:p>
                       <a:pPr algn="ctr"/>
-                      <a:endParaRPr lang="en-US" sz="1200" dirty="0" smtClean="0"/>
+                      <a:endParaRPr lang="en-US" sz="1200" dirty="0"/>
                     </a:p>
                     <a:p>
                       <a:pPr algn="ctr"/>
                       <a:r>
-                        <a:rPr lang="en-US" sz="2000" dirty="0" smtClean="0"/>
+                        <a:rPr lang="en-US" sz="2000" dirty="0"/>
                         <a:t>||</a:t>
                       </a:r>
-                      <a:endParaRPr lang="en-US" sz="2000" dirty="0"/>
                     </a:p>
                   </a:txBody>
                   <a:tcPr>
@@ -3691,6 +3730,11 @@
                     </a:cell3D>
                   </a:tcPr>
                 </a:tc>
+                <a:extLst>
+                  <a:ext uri="{0D108BD9-81ED-4DB2-BD59-A6C34878D82A}">
+                    <a16:rowId xmlns:a16="http://schemas.microsoft.com/office/drawing/2014/main" val="10007"/>
+                  </a:ext>
+                </a:extLst>
               </a:tr>
               <a:tr h="370840">
                 <a:tc>
@@ -3699,12 +3743,12 @@
                     <a:lstStyle/>
                     <a:p>
                       <a:pPr algn="ctr"/>
-                      <a:endParaRPr lang="en-US" sz="1100" dirty="0" smtClean="0"/>
+                      <a:endParaRPr lang="en-US" sz="1100" dirty="0"/>
                     </a:p>
                     <a:p>
                       <a:pPr algn="ctr"/>
                       <a:r>
-                        <a:rPr lang="en-US" sz="2000" dirty="0" smtClean="0"/>
+                        <a:rPr lang="en-US" sz="2000" dirty="0"/>
                         <a:t>Assignment</a:t>
                       </a:r>
                     </a:p>
@@ -3727,11 +3771,11 @@
                     <a:p>
                       <a:pPr algn="ctr"/>
                       <a:r>
-                        <a:rPr lang="en-US" sz="2000" dirty="0" smtClean="0"/>
+                        <a:rPr lang="en-US" sz="2000" dirty="0"/>
                         <a:t>=      +=      -=</a:t>
                       </a:r>
                       <a:r>
-                        <a:rPr lang="en-US" sz="2000" baseline="0" dirty="0" smtClean="0"/>
+                        <a:rPr lang="en-US" sz="2000" baseline="0" dirty="0"/>
                         <a:t>     *=     /=      %=      &amp;&amp;=     ||=</a:t>
                       </a:r>
                       <a:endParaRPr lang="en-US" sz="2000" dirty="0"/>
@@ -3751,10 +3795,9 @@
                     <a:p>
                       <a:pPr algn="ctr"/>
                       <a:r>
-                        <a:rPr lang="en-US" sz="2000" dirty="0" smtClean="0"/>
+                        <a:rPr lang="en-US" sz="2000" dirty="0"/>
                         <a:t>Java Evaluates Last</a:t>
                       </a:r>
-                      <a:endParaRPr lang="en-US" sz="2000" dirty="0"/>
                     </a:p>
                   </a:txBody>
                   <a:tcPr>
@@ -3764,6 +3807,11 @@
                     </a:cell3D>
                   </a:tcPr>
                 </a:tc>
+                <a:extLst>
+                  <a:ext uri="{0D108BD9-81ED-4DB2-BD59-A6C34878D82A}">
+                    <a16:rowId xmlns:a16="http://schemas.microsoft.com/office/drawing/2014/main" val="10008"/>
+                  </a:ext>
+                </a:extLst>
               </a:tr>
             </a:tbl>
           </a:graphicData>
@@ -4148,6 +4196,15 @@
 </file>
 
 <file path=customXml/item1.xml><?xml version="1.0" encoding="utf-8"?>
+<?mso-contentType ?>
+<FormTemplates xmlns="http://schemas.microsoft.com/sharepoint/v3/contenttype/forms">
+  <Display>DocumentLibraryForm</Display>
+  <Edit>DocumentLibraryForm</Edit>
+  <New>DocumentLibraryForm</New>
+</FormTemplates>
+</file>
+
+<file path=customXml/item2.xml><?xml version="1.0" encoding="utf-8"?>
 <ct:contentTypeSchema xmlns:ct="http://schemas.microsoft.com/office/2006/metadata/contentType" xmlns:ma="http://schemas.microsoft.com/office/2006/metadata/properties/metaAttributes" ct:_="" ma:_="" ma:contentTypeName="Document" ma:contentTypeID="0x010100BABADD3A0624AA4E97287821B8F4D7D6" ma:contentTypeVersion="3" ma:contentTypeDescription="Create a new document." ma:contentTypeScope="" ma:versionID="e0073545f5cddffb46c9fa8d01738dd8">
   <xsd:schema xmlns:xsd="http://www.w3.org/2001/XMLSchema" xmlns:xs="http://www.w3.org/2001/XMLSchema" xmlns:p="http://schemas.microsoft.com/office/2006/metadata/properties" xmlns:ns2="5edd459b-714d-42ed-b78f-512da7d1c14e" targetNamespace="http://schemas.microsoft.com/office/2006/metadata/properties" ma:root="true" ma:fieldsID="5b223eadad92f795ae696ccb91d8f218" ns2:_="">
     <xsd:import namespace="5edd459b-714d-42ed-b78f-512da7d1c14e"/>
@@ -4301,15 +4358,6 @@
 </ct:contentTypeSchema>
 </file>
 
-<file path=customXml/item2.xml><?xml version="1.0" encoding="utf-8"?>
-<?mso-contentType ?>
-<FormTemplates xmlns="http://schemas.microsoft.com/sharepoint/v3/contenttype/forms">
-  <Display>DocumentLibraryForm</Display>
-  <Edit>DocumentLibraryForm</Edit>
-  <New>DocumentLibraryForm</New>
-</FormTemplates>
-</file>
-
 <file path=customXml/item3.xml><?xml version="1.0" encoding="utf-8"?>
 <p:properties xmlns:p="http://schemas.microsoft.com/office/2006/metadata/properties" xmlns:xsi="http://www.w3.org/2001/XMLSchema-instance" xmlns:pc="http://schemas.microsoft.com/office/infopath/2007/PartnerControls">
   <documentManagement/>
@@ -4317,13 +4365,36 @@
 </file>
 
 <file path=customXml/itemProps1.xml><?xml version="1.0" encoding="utf-8"?>
-<ds:datastoreItem xmlns:ds="http://schemas.openxmlformats.org/officeDocument/2006/customXml" ds:itemID="{A98F3001-92BF-46BD-BBA3-2D5BB4E38CA9}"/>
+<ds:datastoreItem xmlns:ds="http://schemas.openxmlformats.org/officeDocument/2006/customXml" ds:itemID="{D22430F7-FF00-4A3D-8817-FB002CA806F7}">
+  <ds:schemaRefs>
+    <ds:schemaRef ds:uri="http://schemas.microsoft.com/sharepoint/v3/contenttype/forms"/>
+  </ds:schemaRefs>
+</ds:datastoreItem>
 </file>
 
 <file path=customXml/itemProps2.xml><?xml version="1.0" encoding="utf-8"?>
-<ds:datastoreItem xmlns:ds="http://schemas.openxmlformats.org/officeDocument/2006/customXml" ds:itemID="{D22430F7-FF00-4A3D-8817-FB002CA806F7}"/>
+<ds:datastoreItem xmlns:ds="http://schemas.openxmlformats.org/officeDocument/2006/customXml" ds:itemID="{A98F3001-92BF-46BD-BBA3-2D5BB4E38CA9}">
+  <ds:schemaRefs>
+    <ds:schemaRef ds:uri="http://schemas.microsoft.com/office/2006/metadata/contentType"/>
+    <ds:schemaRef ds:uri="http://schemas.microsoft.com/office/2006/metadata/properties/metaAttributes"/>
+    <ds:schemaRef ds:uri="http://www.w3.org/2001/XMLSchema"/>
+    <ds:schemaRef ds:uri="http://schemas.microsoft.com/office/2006/metadata/properties"/>
+    <ds:schemaRef ds:uri="5edd459b-714d-42ed-b78f-512da7d1c14e"/>
+    <ds:schemaRef ds:uri="http://schemas.microsoft.com/office/2006/documentManagement/types"/>
+    <ds:schemaRef ds:uri="http://schemas.microsoft.com/office/infopath/2007/PartnerControls"/>
+    <ds:schemaRef ds:uri="http://schemas.openxmlformats.org/package/2006/metadata/core-properties"/>
+    <ds:schemaRef ds:uri="http://purl.org/dc/elements/1.1/"/>
+    <ds:schemaRef ds:uri="http://purl.org/dc/terms/"/>
+    <ds:schemaRef ds:uri="http://schemas.microsoft.com/internal/obd"/>
+  </ds:schemaRefs>
+</ds:datastoreItem>
 </file>
 
 <file path=customXml/itemProps3.xml><?xml version="1.0" encoding="utf-8"?>
-<ds:datastoreItem xmlns:ds="http://schemas.openxmlformats.org/officeDocument/2006/customXml" ds:itemID="{803B2E8B-2410-4DF5-9707-A728241E0755}"/>
+<ds:datastoreItem xmlns:ds="http://schemas.openxmlformats.org/officeDocument/2006/customXml" ds:itemID="{803B2E8B-2410-4DF5-9707-A728241E0755}">
+  <ds:schemaRefs>
+    <ds:schemaRef ds:uri="http://schemas.microsoft.com/office/2006/metadata/properties"/>
+    <ds:schemaRef ds:uri="http://schemas.microsoft.com/office/infopath/2007/PartnerControls"/>
+  </ds:schemaRefs>
+</ds:datastoreItem>
 </file>
</xml_diff>